<commit_message>
removed uml diagrams folder, updated uml and presentation
</commit_message>
<xml_diff>
--- a/report/DesignReport/Presentation1.pptx
+++ b/report/DesignReport/Presentation1.pptx
@@ -204,7 +204,7 @@
             <a:fld id="{D3FA4D68-0C65-4A9B-94D6-CEB301447A54}" type="datetimeFigureOut">
               <a:rPr lang="nb-NO" smtClean="0"/>
               <a:pPr/>
-              <a:t>04.11.2011</a:t>
+              <a:t>05.11.2011</a:t>
             </a:fld>
             <a:endParaRPr lang="nb-NO"/>
           </a:p>
@@ -1472,7 +1472,7 @@
             <a:fld id="{936BC739-4DDC-4C6E-B585-4FAA5E6E3267}" type="datetimeFigureOut">
               <a:rPr lang="en-US" smtClean="0"/>
               <a:pPr/>
-              <a:t>11/4/2011</a:t>
+              <a:t>11/5/2011</a:t>
             </a:fld>
             <a:endParaRPr lang="en-US"/>
           </a:p>
@@ -1639,7 +1639,7 @@
             <a:fld id="{936BC739-4DDC-4C6E-B585-4FAA5E6E3267}" type="datetimeFigureOut">
               <a:rPr lang="en-US" smtClean="0"/>
               <a:pPr/>
-              <a:t>11/4/2011</a:t>
+              <a:t>11/5/2011</a:t>
             </a:fld>
             <a:endParaRPr lang="en-US"/>
           </a:p>
@@ -1816,7 +1816,7 @@
             <a:fld id="{936BC739-4DDC-4C6E-B585-4FAA5E6E3267}" type="datetimeFigureOut">
               <a:rPr lang="en-US" smtClean="0"/>
               <a:pPr/>
-              <a:t>11/4/2011</a:t>
+              <a:t>11/5/2011</a:t>
             </a:fld>
             <a:endParaRPr lang="en-US"/>
           </a:p>
@@ -1983,7 +1983,7 @@
             <a:fld id="{936BC739-4DDC-4C6E-B585-4FAA5E6E3267}" type="datetimeFigureOut">
               <a:rPr lang="en-US" smtClean="0"/>
               <a:pPr/>
-              <a:t>11/4/2011</a:t>
+              <a:t>11/5/2011</a:t>
             </a:fld>
             <a:endParaRPr lang="en-US"/>
           </a:p>
@@ -2226,7 +2226,7 @@
             <a:fld id="{936BC739-4DDC-4C6E-B585-4FAA5E6E3267}" type="datetimeFigureOut">
               <a:rPr lang="en-US" smtClean="0"/>
               <a:pPr/>
-              <a:t>11/4/2011</a:t>
+              <a:t>11/5/2011</a:t>
             </a:fld>
             <a:endParaRPr lang="en-US"/>
           </a:p>
@@ -2511,7 +2511,7 @@
             <a:fld id="{936BC739-4DDC-4C6E-B585-4FAA5E6E3267}" type="datetimeFigureOut">
               <a:rPr lang="en-US" smtClean="0"/>
               <a:pPr/>
-              <a:t>11/4/2011</a:t>
+              <a:t>11/5/2011</a:t>
             </a:fld>
             <a:endParaRPr lang="en-US"/>
           </a:p>
@@ -2930,7 +2930,7 @@
             <a:fld id="{936BC739-4DDC-4C6E-B585-4FAA5E6E3267}" type="datetimeFigureOut">
               <a:rPr lang="en-US" smtClean="0"/>
               <a:pPr/>
-              <a:t>11/4/2011</a:t>
+              <a:t>11/5/2011</a:t>
             </a:fld>
             <a:endParaRPr lang="en-US"/>
           </a:p>
@@ -3045,7 +3045,7 @@
             <a:fld id="{936BC739-4DDC-4C6E-B585-4FAA5E6E3267}" type="datetimeFigureOut">
               <a:rPr lang="en-US" smtClean="0"/>
               <a:pPr/>
-              <a:t>11/4/2011</a:t>
+              <a:t>11/5/2011</a:t>
             </a:fld>
             <a:endParaRPr lang="en-US"/>
           </a:p>
@@ -3137,7 +3137,7 @@
             <a:fld id="{936BC739-4DDC-4C6E-B585-4FAA5E6E3267}" type="datetimeFigureOut">
               <a:rPr lang="en-US" smtClean="0"/>
               <a:pPr/>
-              <a:t>11/4/2011</a:t>
+              <a:t>11/5/2011</a:t>
             </a:fld>
             <a:endParaRPr lang="en-US"/>
           </a:p>
@@ -3411,7 +3411,7 @@
             <a:fld id="{936BC739-4DDC-4C6E-B585-4FAA5E6E3267}" type="datetimeFigureOut">
               <a:rPr lang="en-US" smtClean="0"/>
               <a:pPr/>
-              <a:t>11/4/2011</a:t>
+              <a:t>11/5/2011</a:t>
             </a:fld>
             <a:endParaRPr lang="en-US"/>
           </a:p>
@@ -3661,7 +3661,7 @@
             <a:fld id="{936BC739-4DDC-4C6E-B585-4FAA5E6E3267}" type="datetimeFigureOut">
               <a:rPr lang="en-US" smtClean="0"/>
               <a:pPr/>
-              <a:t>11/4/2011</a:t>
+              <a:t>11/5/2011</a:t>
             </a:fld>
             <a:endParaRPr lang="en-US"/>
           </a:p>
@@ -3871,7 +3871,7 @@
             <a:fld id="{936BC739-4DDC-4C6E-B585-4FAA5E6E3267}" type="datetimeFigureOut">
               <a:rPr lang="en-US" smtClean="0"/>
               <a:pPr/>
-              <a:t>11/4/2011</a:t>
+              <a:t>11/5/2011</a:t>
             </a:fld>
             <a:endParaRPr lang="en-US"/>
           </a:p>
@@ -4950,6 +4950,53 @@
           </a:p>
         </p:txBody>
       </p:sp>
+      <p:sp>
+        <p:nvSpPr>
+          <p:cNvPr id="8" name="TextBox 7"/>
+          <p:cNvSpPr txBox="1"/>
+          <p:nvPr/>
+        </p:nvSpPr>
+        <p:spPr>
+          <a:xfrm>
+            <a:off x="762000" y="2438400"/>
+            <a:ext cx="4092787" cy="646331"/>
+          </a:xfrm>
+          <a:prstGeom prst="rect">
+            <a:avLst/>
+          </a:prstGeom>
+          <a:noFill/>
+        </p:spPr>
+        <p:txBody>
+          <a:bodyPr wrap="none" rtlCol="0">
+            <a:spAutoFit/>
+          </a:bodyPr>
+          <a:lstStyle/>
+          <a:p>
+            <a:pPr>
+              <a:buFont typeface="Arial" pitchFamily="34" charset="0"/>
+              <a:buChar char="•"/>
+            </a:pPr>
+            <a:r>
+              <a:rPr lang="en-US" dirty="0" smtClean="0">
+                <a:latin typeface="Times New Roman" pitchFamily="18" charset="0"/>
+              </a:rPr>
+              <a:t>Implements the system as browser </a:t>
+            </a:r>
+            <a:r>
+              <a:rPr lang="en-US" dirty="0" err="1" smtClean="0">
+                <a:latin typeface="Times New Roman" pitchFamily="18" charset="0"/>
+              </a:rPr>
+              <a:t>plugin</a:t>
+            </a:r>
+            <a:endParaRPr lang="en-US" dirty="0" smtClean="0">
+              <a:latin typeface="Times New Roman" pitchFamily="18" charset="0"/>
+            </a:endParaRPr>
+          </a:p>
+          <a:p>
+            <a:endParaRPr lang="nb-NO" dirty="0"/>
+          </a:p>
+        </p:txBody>
+      </p:sp>
     </p:spTree>
   </p:cSld>
   <p:clrMapOvr>
@@ -5582,7 +5629,7 @@
         <p:spPr>
           <a:xfrm>
             <a:off x="1066800" y="2514600"/>
-            <a:ext cx="6858000" cy="1815882"/>
+            <a:ext cx="6858000" cy="1569660"/>
           </a:xfrm>
           <a:prstGeom prst="rect">
             <a:avLst/>
@@ -5666,30 +5713,6 @@
               </a:lnSpc>
             </a:pPr>
             <a:endParaRPr lang="en-US" sz="2000" dirty="0" smtClean="0">
-              <a:latin typeface="Times New Roman" pitchFamily="18" charset="0"/>
-            </a:endParaRPr>
-          </a:p>
-          <a:p>
-            <a:pPr>
-              <a:lnSpc>
-                <a:spcPct val="80000"/>
-              </a:lnSpc>
-              <a:buFont typeface="Arial" pitchFamily="34" charset="0"/>
-              <a:buChar char="•"/>
-            </a:pPr>
-            <a:r>
-              <a:rPr lang="en-US" sz="2000" dirty="0" smtClean="0">
-                <a:latin typeface="Times New Roman" pitchFamily="18" charset="0"/>
-              </a:rPr>
-              <a:t>Implements the system as browser </a:t>
-            </a:r>
-            <a:r>
-              <a:rPr lang="en-US" sz="2000" dirty="0" err="1" smtClean="0">
-                <a:latin typeface="Times New Roman" pitchFamily="18" charset="0"/>
-              </a:rPr>
-              <a:t>plugin</a:t>
-            </a:r>
-            <a:endParaRPr lang="en-US" sz="2000" dirty="0">
               <a:latin typeface="Times New Roman" pitchFamily="18" charset="0"/>
             </a:endParaRPr>
           </a:p>
@@ -6089,9 +6112,35 @@
           </a:p>
         </p:txBody>
       </p:sp>
+      <p:sp>
+        <p:nvSpPr>
+          <p:cNvPr id="8" name="TextBox 7"/>
+          <p:cNvSpPr txBox="1"/>
+          <p:nvPr/>
+        </p:nvSpPr>
+        <p:spPr>
+          <a:xfrm>
+            <a:off x="2895600" y="3276600"/>
+            <a:ext cx="184731" cy="369332"/>
+          </a:xfrm>
+          <a:prstGeom prst="rect">
+            <a:avLst/>
+          </a:prstGeom>
+          <a:noFill/>
+        </p:spPr>
+        <p:txBody>
+          <a:bodyPr wrap="none" rtlCol="0">
+            <a:spAutoFit/>
+          </a:bodyPr>
+          <a:lstStyle/>
+          <a:p>
+            <a:endParaRPr lang="nb-NO" dirty="0"/>
+          </a:p>
+        </p:txBody>
+      </p:sp>
       <p:pic>
         <p:nvPicPr>
-          <p:cNvPr id="11" name="Picture 2"/>
+          <p:cNvPr id="2" name="Picture 2"/>
           <p:cNvPicPr>
             <a:picLocks noChangeAspect="1" noChangeArrowheads="1"/>
           </p:cNvPicPr>
@@ -6106,8 +6155,8 @@
         </p:blipFill>
         <p:spPr bwMode="auto">
           <a:xfrm>
-            <a:off x="1295400" y="2209800"/>
-            <a:ext cx="5521325" cy="3663950"/>
+            <a:off x="1219200" y="2133600"/>
+            <a:ext cx="5562600" cy="3962400"/>
           </a:xfrm>
           <a:prstGeom prst="rect">
             <a:avLst/>
@@ -6119,7 +6168,6 @@
             <a:headEnd/>
             <a:tailEnd/>
           </a:ln>
-          <a:effectLst/>
         </p:spPr>
       </p:pic>
     </p:spTree>
@@ -6628,103 +6676,9 @@
           </a:p>
         </p:txBody>
       </p:sp>
-      <p:sp>
-        <p:nvSpPr>
-          <p:cNvPr id="10" name="Rectangle 3"/>
-          <p:cNvSpPr txBox="1">
-            <a:spLocks noChangeArrowheads="1"/>
-          </p:cNvSpPr>
-          <p:nvPr/>
-        </p:nvSpPr>
-        <p:spPr>
-          <a:xfrm>
-            <a:off x="1335088" y="2170113"/>
-            <a:ext cx="7772400" cy="4114800"/>
-          </a:xfrm>
-          <a:prstGeom prst="rect">
-            <a:avLst/>
-          </a:prstGeom>
-        </p:spPr>
-        <p:txBody>
-          <a:bodyPr vert="horz" lIns="91440" tIns="45720" rIns="91440" bIns="45720" rtlCol="0">
-            <a:normAutofit/>
-          </a:bodyPr>
-          <a:lstStyle/>
-          <a:p>
-            <a:pPr marL="0" marR="0" lvl="0" indent="0" algn="ctr" defTabSz="914400" rtl="0" eaLnBrk="1" fontAlgn="auto" latinLnBrk="0" hangingPunct="1">
-              <a:lnSpc>
-                <a:spcPct val="90000"/>
-              </a:lnSpc>
-              <a:spcBef>
-                <a:spcPct val="20000"/>
-              </a:spcBef>
-              <a:spcAft>
-                <a:spcPts val="0"/>
-              </a:spcAft>
-              <a:buClrTx/>
-              <a:buSzTx/>
-              <a:buFont typeface="Wingdings" pitchFamily="2" charset="2"/>
-              <a:buNone/>
-              <a:tabLst/>
-              <a:defRPr/>
-            </a:pPr>
-            <a:endParaRPr kumimoji="0" lang="en-US" sz="2400" b="0" i="0" u="none" strike="noStrike" kern="1200" cap="none" spc="0" normalizeH="0" baseline="0" noProof="0" smtClean="0">
-              <a:ln>
-                <a:noFill/>
-              </a:ln>
-              <a:solidFill>
-                <a:schemeClr val="tx1">
-                  <a:tint val="75000"/>
-                </a:schemeClr>
-              </a:solidFill>
-              <a:effectLst/>
-              <a:uLnTx/>
-              <a:uFillTx/>
-              <a:latin typeface="Times New Roman" pitchFamily="18" charset="0"/>
-              <a:ea typeface="+mn-ea"/>
-              <a:cs typeface="+mn-cs"/>
-            </a:endParaRPr>
-          </a:p>
-          <a:p>
-            <a:pPr marL="1828800" marR="0" lvl="4" indent="0" algn="ctr" defTabSz="914400" rtl="0" eaLnBrk="1" fontAlgn="auto" latinLnBrk="0" hangingPunct="1">
-              <a:lnSpc>
-                <a:spcPct val="90000"/>
-              </a:lnSpc>
-              <a:spcBef>
-                <a:spcPct val="20000"/>
-              </a:spcBef>
-              <a:spcAft>
-                <a:spcPts val="0"/>
-              </a:spcAft>
-              <a:buClrTx/>
-              <a:buSzTx/>
-              <a:buFont typeface="Wingdings" pitchFamily="2" charset="2"/>
-              <a:buNone/>
-              <a:tabLst/>
-              <a:defRPr/>
-            </a:pPr>
-            <a:endParaRPr kumimoji="0" lang="en-US" sz="1800" b="0" i="0" u="none" strike="noStrike" kern="1200" cap="none" spc="0" normalizeH="0" baseline="0" noProof="0" dirty="0">
-              <a:ln>
-                <a:noFill/>
-              </a:ln>
-              <a:solidFill>
-                <a:schemeClr val="tx1">
-                  <a:tint val="75000"/>
-                </a:schemeClr>
-              </a:solidFill>
-              <a:effectLst/>
-              <a:uLnTx/>
-              <a:uFillTx/>
-              <a:latin typeface="Times New Roman" pitchFamily="18" charset="0"/>
-              <a:ea typeface="+mn-ea"/>
-              <a:cs typeface="+mn-cs"/>
-            </a:endParaRPr>
-          </a:p>
-        </p:txBody>
-      </p:sp>
       <p:pic>
         <p:nvPicPr>
-          <p:cNvPr id="11" name="Picture 4" descr="C:\Users\Aman\Costumer-Driven-Project\report\DesignReport\uml diagrams\flowchart.png"/>
+          <p:cNvPr id="2" name="Picture 2" descr="C:\Users\Aman\Costumer-Driven-Project\report\DesignReport\uml diagrams\flowchart.png"/>
           <p:cNvPicPr>
             <a:picLocks noChangeAspect="1" noChangeArrowheads="1"/>
           </p:cNvPicPr>
@@ -6739,8 +6693,8 @@
         </p:blipFill>
         <p:spPr bwMode="auto">
           <a:xfrm>
-            <a:off x="1600200" y="2286000"/>
-            <a:ext cx="5486400" cy="3962400"/>
+            <a:off x="990600" y="2286000"/>
+            <a:ext cx="6019800" cy="3810000"/>
           </a:xfrm>
           <a:prstGeom prst="rect">
             <a:avLst/>

</xml_diff>